<commit_message>
refactor: update verso templates for improved consistency and formatting
</commit_message>
<xml_diff>
--- a/public/templates/verso-2a.pptx
+++ b/public/templates/verso-2a.pptx
@@ -105,6 +105,11 @@
       </a:defRPr>
     </a:lvl9pPr>
   </p:defaultTextStyle>
+  <p:extLst>
+    <p:ext uri="{EFAFB233-063F-42B5-8137-9DF3F51BA10A}">
+      <p15:sldGuideLst xmlns:p15="http://schemas.microsoft.com/office/powerpoint/2012/main"/>
+    </p:ext>
+  </p:extLst>
 </p:presentation>
 </file>
 
@@ -3136,7 +3141,7 @@
                 <a:spcPct val="100000"/>
               </a:lnSpc>
             </a:pPr>
-            <a:endParaRPr lang="en-US" sz="700" b="0" u="none" strike="noStrike">
+            <a:endParaRPr lang="en-US" sz="700" b="0" u="none" strike="noStrike" dirty="0">
               <a:solidFill>
                 <a:srgbClr val="000000"/>
               </a:solidFill>
@@ -3150,7 +3155,7 @@
                 <a:spcPct val="100000"/>
               </a:lnSpc>
             </a:pPr>
-            <a:endParaRPr lang="en-US" sz="700" b="0" u="none" strike="noStrike">
+            <a:endParaRPr lang="en-US" sz="700" b="0" u="none" strike="noStrike" dirty="0">
               <a:solidFill>
                 <a:srgbClr val="000000"/>
               </a:solidFill>
@@ -3164,7 +3169,7 @@
                 <a:spcPct val="100000"/>
               </a:lnSpc>
             </a:pPr>
-            <a:endParaRPr lang="en-US" sz="700" b="0" u="none" strike="noStrike">
+            <a:endParaRPr lang="en-US" sz="700" b="0" u="none" strike="noStrike" dirty="0">
               <a:solidFill>
                 <a:srgbClr val="000000"/>
               </a:solidFill>
@@ -3247,7 +3252,7 @@
               </a:lnSpc>
             </a:pPr>
             <a:r>
-              <a:rPr lang="pt-BR" sz="800" b="0" u="none" strike="noStrike" dirty="0">
+              <a:rPr lang="pt-BR" sz="800" b="0" u="none" strike="noStrike">
                 <a:solidFill>
                   <a:srgbClr val="000000"/>
                 </a:solidFill>
@@ -3257,13 +3262,22 @@
               <a:t>[</a:t>
             </a:r>
             <a:r>
+              <a:rPr lang="pt-BR" sz="800">
+                <a:solidFill>
+                  <a:srgbClr val="000000"/>
+                </a:solidFill>
+                <a:latin typeface="Arial"/>
+              </a:rPr>
+              <a:t>qualificacao</a:t>
+            </a:r>
+            <a:r>
               <a:rPr lang="pt-BR" sz="800" dirty="0">
                 <a:solidFill>
                   <a:srgbClr val="000000"/>
                 </a:solidFill>
                 <a:latin typeface="Arial"/>
               </a:rPr>
-              <a:t>qualificação_profissional1]</a:t>
+              <a:t>_profissional1]</a:t>
             </a:r>
             <a:endParaRPr lang="pt-BR" sz="800" b="0" u="none" strike="noStrike" dirty="0">
               <a:solidFill>
@@ -3316,7 +3330,7 @@
                 </a:solidFill>
                 <a:latin typeface="Arial"/>
               </a:rPr>
-              <a:t>qualificação1</a:t>
+              <a:t>qualificacao1</a:t>
             </a:r>
             <a:r>
               <a:rPr lang="pt-BR" sz="800" b="0" u="none" strike="noStrike" dirty="0">
@@ -3564,7 +3578,7 @@
                         <a:t>[</a:t>
                       </a:r>
                       <a:r>
-                        <a:rPr lang="pt-BR" sz="1000" b="0" i="0" u="none" strike="noStrike" noProof="0" err="1">
+                        <a:rPr lang="pt-BR" sz="1000" b="0" i="0" u="none" strike="noStrike" noProof="0" dirty="0" err="1">
                           <a:solidFill>
                             <a:srgbClr val="000000"/>
                           </a:solidFill>
@@ -3583,7 +3597,7 @@
                         </a:rPr>
                         <a:t>]</a:t>
                       </a:r>
-                      <a:endParaRPr lang="en-US" sz="1200" b="0" u="none" strike="noStrike">
+                      <a:endParaRPr lang="en-US" sz="1200" b="0" u="none" strike="noStrike" dirty="0">
                         <a:solidFill>
                           <a:srgbClr val="000000"/>
                         </a:solidFill>
@@ -3692,7 +3706,7 @@
                 <a:spcPct val="100000"/>
               </a:lnSpc>
             </a:pPr>
-            <a:endParaRPr lang="en-US" sz="700" b="0" u="none" strike="noStrike">
+            <a:endParaRPr lang="en-US" sz="700" b="0" u="none" strike="noStrike" dirty="0">
               <a:solidFill>
                 <a:srgbClr val="000000"/>
               </a:solidFill>
@@ -3706,7 +3720,7 @@
                 <a:spcPct val="100000"/>
               </a:lnSpc>
             </a:pPr>
-            <a:endParaRPr lang="en-US" sz="700" b="0" u="none" strike="noStrike">
+            <a:endParaRPr lang="en-US" sz="700" b="0" u="none" strike="noStrike" dirty="0">
               <a:solidFill>
                 <a:srgbClr val="000000"/>
               </a:solidFill>
@@ -3720,7 +3734,7 @@
                 <a:spcPct val="100000"/>
               </a:lnSpc>
             </a:pPr>
-            <a:endParaRPr lang="en-US" sz="700" b="0" u="none" strike="noStrike">
+            <a:endParaRPr lang="en-US" sz="700" b="0" u="none" strike="noStrike" dirty="0">
               <a:solidFill>
                 <a:srgbClr val="000000"/>
               </a:solidFill>
@@ -3798,7 +3812,7 @@
                 <a:latin typeface="Arial"/>
                 <a:ea typeface="Times New Roman"/>
               </a:rPr>
-              <a:t>[qualificação</a:t>
+              <a:t>[qualificacao</a:t>
             </a:r>
             <a:r>
               <a:rPr lang="pt-BR" sz="800" b="0" u="none" strike="noStrike" dirty="0">
@@ -3887,7 +3901,7 @@
                 <a:latin typeface="Arial"/>
                 <a:ea typeface="Times New Roman"/>
               </a:rPr>
-              <a:t>qualificação2</a:t>
+              <a:t>qualificacao2</a:t>
             </a:r>
             <a:r>
               <a:rPr lang="pt-BR" sz="800" b="0" u="none" strike="noStrike" dirty="0">

</xml_diff>

<commit_message>
chore: update verso-2a.pptx template file
</commit_message>
<xml_diff>
--- a/public/templates/verso-2a.pptx
+++ b/public/templates/verso-2a.pptx
@@ -3043,7 +3043,7 @@
               <a:t>[</a:t>
             </a:r>
             <a:r>
-              <a:rPr lang="pt-BR" sz="900" b="0" u="none" strike="noStrike" err="1">
+              <a:rPr lang="pt-BR" sz="900" b="0" u="none" strike="noStrike" dirty="0" err="1">
                 <a:solidFill>
                   <a:srgbClr val="000000"/>
                 </a:solidFill>
@@ -3081,8 +3081,8 @@
         </p:nvSpPr>
         <p:spPr>
           <a:xfrm>
-            <a:off x="6878160" y="1698480"/>
-            <a:ext cx="2230200" cy="998820"/>
+            <a:off x="6878159" y="1698480"/>
+            <a:ext cx="2507333" cy="983431"/>
           </a:xfrm>
           <a:prstGeom prst="rect">
             <a:avLst/>
@@ -3108,7 +3108,7 @@
           <a:fontRef idx="minor"/>
         </p:style>
         <p:txBody>
-          <a:bodyPr lIns="90000" tIns="45000" rIns="90000" bIns="45000" anchor="t">
+          <a:bodyPr wrap="square" lIns="90000" tIns="45000" rIns="90000" bIns="45000" anchor="t">
             <a:spAutoFit/>
           </a:bodyPr>
           <a:lstStyle/>
@@ -3125,39 +3125,20 @@
                 </a:solidFill>
                 <a:latin typeface="Arial"/>
               </a:rPr>
-              <a:t>[assinatura_1]</a:t>
-            </a:r>
-            <a:endParaRPr lang="en-US" sz="700" b="0" u="none" strike="noStrike" dirty="0">
+              <a:t>[</a:t>
+            </a:r>
+            <a:r>
+              <a:rPr lang="pt-BR" sz="800" b="1" dirty="0">
+                <a:solidFill>
+                  <a:schemeClr val="dk1"/>
+                </a:solidFill>
+                <a:latin typeface="Arial"/>
+              </a:rPr>
+              <a:t>assinatura_1]</a:t>
+            </a:r>
+            <a:endParaRPr lang="en-US" sz="800" b="0" u="none" strike="noStrike" dirty="0">
               <a:solidFill>
                 <a:schemeClr val="dk1"/>
-              </a:solidFill>
-              <a:uFillTx/>
-              <a:latin typeface="Arial"/>
-            </a:endParaRPr>
-          </a:p>
-          <a:p>
-            <a:pPr algn="ctr" defTabSz="914400">
-              <a:lnSpc>
-                <a:spcPct val="100000"/>
-              </a:lnSpc>
-            </a:pPr>
-            <a:endParaRPr lang="en-US" sz="700" b="0" u="none" strike="noStrike" dirty="0">
-              <a:solidFill>
-                <a:srgbClr val="000000"/>
-              </a:solidFill>
-              <a:uFillTx/>
-              <a:latin typeface="Arial"/>
-            </a:endParaRPr>
-          </a:p>
-          <a:p>
-            <a:pPr algn="ctr" defTabSz="914400">
-              <a:lnSpc>
-                <a:spcPct val="100000"/>
-              </a:lnSpc>
-            </a:pPr>
-            <a:endParaRPr lang="en-US" sz="700" b="0" u="none" strike="noStrike" dirty="0">
-              <a:solidFill>
-                <a:srgbClr val="000000"/>
               </a:solidFill>
               <a:uFillTx/>
               <a:latin typeface="Arial"/>
@@ -3252,7 +3233,7 @@
               </a:lnSpc>
             </a:pPr>
             <a:r>
-              <a:rPr lang="pt-BR" sz="800" b="0" u="none" strike="noStrike">
+              <a:rPr lang="pt-BR" sz="700" b="0" u="none" strike="noStrike" dirty="0">
                 <a:solidFill>
                   <a:srgbClr val="000000"/>
                 </a:solidFill>
@@ -3262,24 +3243,15 @@
               <a:t>[</a:t>
             </a:r>
             <a:r>
-              <a:rPr lang="pt-BR" sz="800">
+              <a:rPr lang="pt-BR" sz="700" dirty="0">
                 <a:solidFill>
                   <a:srgbClr val="000000"/>
                 </a:solidFill>
                 <a:latin typeface="Arial"/>
               </a:rPr>
-              <a:t>qualificacao</a:t>
-            </a:r>
-            <a:r>
-              <a:rPr lang="pt-BR" sz="800" dirty="0">
-                <a:solidFill>
-                  <a:srgbClr val="000000"/>
-                </a:solidFill>
-                <a:latin typeface="Arial"/>
-              </a:rPr>
-              <a:t>_profissional1]</a:t>
-            </a:r>
-            <a:endParaRPr lang="pt-BR" sz="800" b="0" u="none" strike="noStrike" dirty="0">
+              <a:t>qualificacao_profissional1]</a:t>
+            </a:r>
+            <a:endParaRPr lang="pt-BR" sz="700" b="0" u="none" strike="noStrike" dirty="0">
               <a:solidFill>
                 <a:srgbClr val="000000"/>
               </a:solidFill>
@@ -3295,7 +3267,7 @@
               </a:lnSpc>
             </a:pPr>
             <a:r>
-              <a:rPr lang="pt-BR" sz="800" b="0" u="none" strike="noStrike" dirty="0">
+              <a:rPr lang="pt-BR" sz="700" b="0" u="none" strike="noStrike" dirty="0">
                 <a:solidFill>
                   <a:srgbClr val="000000"/>
                 </a:solidFill>
@@ -3305,7 +3277,7 @@
               <a:t> [</a:t>
             </a:r>
             <a:r>
-              <a:rPr lang="pt-BR" sz="800" dirty="0">
+              <a:rPr lang="pt-BR" sz="700" dirty="0">
                 <a:solidFill>
                   <a:srgbClr val="000000"/>
                 </a:solidFill>
@@ -3314,7 +3286,7 @@
               <a:t>registro</a:t>
             </a:r>
             <a:r>
-              <a:rPr lang="pt-BR" sz="800" b="0" u="none" strike="noStrike" dirty="0">
+              <a:rPr lang="pt-BR" sz="700" b="0" u="none" strike="noStrike" dirty="0">
                 <a:solidFill>
                   <a:srgbClr val="000000"/>
                 </a:solidFill>
@@ -3324,7 +3296,7 @@
               <a:t>_</a:t>
             </a:r>
             <a:r>
-              <a:rPr lang="pt-BR" sz="800" dirty="0">
+              <a:rPr lang="pt-BR" sz="700" dirty="0">
                 <a:solidFill>
                   <a:srgbClr val="000000"/>
                 </a:solidFill>
@@ -3333,7 +3305,7 @@
               <a:t>qualificacao1</a:t>
             </a:r>
             <a:r>
-              <a:rPr lang="pt-BR" sz="800" b="0" u="none" strike="noStrike" dirty="0">
+              <a:rPr lang="pt-BR" sz="700" b="0" u="none" strike="noStrike" dirty="0">
                 <a:solidFill>
                   <a:srgbClr val="000000"/>
                 </a:solidFill>
@@ -3342,7 +3314,7 @@
               </a:rPr>
               <a:t>]</a:t>
             </a:r>
-            <a:endParaRPr lang="en-US" sz="800" b="0" u="none" strike="noStrike" dirty="0">
+            <a:endParaRPr lang="en-US" sz="700" b="0" u="none" strike="noStrike" dirty="0">
               <a:solidFill>
                 <a:srgbClr val="000000"/>
               </a:solidFill>
@@ -3351,6 +3323,34 @@
               <a:cs typeface="Arial"/>
             </a:endParaRPr>
           </a:p>
+          <a:p>
+            <a:pPr algn="ctr" defTabSz="914400">
+              <a:lnSpc>
+                <a:spcPct val="100000"/>
+              </a:lnSpc>
+            </a:pPr>
+            <a:endParaRPr lang="en-US" sz="700" b="0" u="none" strike="noStrike" dirty="0">
+              <a:solidFill>
+                <a:srgbClr val="000000"/>
+              </a:solidFill>
+              <a:uFillTx/>
+              <a:latin typeface="Arial"/>
+            </a:endParaRPr>
+          </a:p>
+          <a:p>
+            <a:pPr algn="ctr" defTabSz="914400">
+              <a:lnSpc>
+                <a:spcPct val="100000"/>
+              </a:lnSpc>
+            </a:pPr>
+            <a:endParaRPr lang="en-US" sz="700" b="0" u="none" strike="noStrike" dirty="0">
+              <a:solidFill>
+                <a:srgbClr val="000000"/>
+              </a:solidFill>
+              <a:uFillTx/>
+              <a:latin typeface="Arial"/>
+            </a:endParaRPr>
+          </a:p>
         </p:txBody>
       </p:sp>
       <p:graphicFrame>
@@ -3360,7 +3360,7 @@
           <p:nvPr>
             <p:extLst>
               <p:ext uri="{D42A27DB-BD31-4B8C-83A1-F6EECF244321}">
-                <p14:modId xmlns:p14="http://schemas.microsoft.com/office/powerpoint/2010/main" val="856349569"/>
+                <p14:modId xmlns:p14="http://schemas.microsoft.com/office/powerpoint/2010/main" val="4231991321"/>
               </p:ext>
             </p:extLst>
           </p:nvPr>
@@ -3568,7 +3568,7 @@
                         </a:lnSpc>
                       </a:pPr>
                       <a:r>
-                        <a:rPr lang="pt-BR" sz="1200" b="0" u="none" strike="noStrike" dirty="0">
+                        <a:rPr lang="pt-BR" sz="1000" b="0" u="none" strike="noStrike" dirty="0">
                           <a:solidFill>
                             <a:srgbClr val="000000"/>
                           </a:solidFill>
@@ -3588,7 +3588,7 @@
                         <a:t>conteudo</a:t>
                       </a:r>
                       <a:r>
-                        <a:rPr lang="pt-BR" sz="1200" b="0" u="none" strike="noStrike" dirty="0">
+                        <a:rPr lang="pt-BR" sz="1000" b="0" u="none" strike="noStrike" dirty="0">
                           <a:solidFill>
                             <a:srgbClr val="000000"/>
                           </a:solidFill>
@@ -3597,7 +3597,7 @@
                         </a:rPr>
                         <a:t>]</a:t>
                       </a:r>
-                      <a:endParaRPr lang="en-US" sz="1200" b="0" u="none" strike="noStrike" dirty="0">
+                      <a:endParaRPr lang="en-US" sz="1000" b="0" u="none" strike="noStrike" dirty="0">
                         <a:solidFill>
                           <a:srgbClr val="000000"/>
                         </a:solidFill>
@@ -3653,7 +3653,7 @@
         <p:spPr>
           <a:xfrm>
             <a:off x="6878160" y="2760480"/>
-            <a:ext cx="2230200" cy="998820"/>
+            <a:ext cx="2507332" cy="983431"/>
           </a:xfrm>
           <a:prstGeom prst="rect">
             <a:avLst/>
@@ -3679,7 +3679,7 @@
           <a:fontRef idx="minor"/>
         </p:style>
         <p:txBody>
-          <a:bodyPr lIns="90000" tIns="45000" rIns="90000" bIns="45000" anchor="t">
+          <a:bodyPr wrap="square" lIns="90000" tIns="45000" rIns="90000" bIns="45000" anchor="t">
             <a:spAutoFit/>
           </a:bodyPr>
           <a:lstStyle/>
@@ -3690,7 +3690,7 @@
               </a:lnSpc>
             </a:pPr>
             <a:r>
-              <a:rPr lang="pt-BR" sz="700" b="1" dirty="0">
+              <a:rPr lang="pt-BR" sz="800" b="1" dirty="0">
                 <a:solidFill>
                   <a:schemeClr val="dk1"/>
                 </a:solidFill>
@@ -3698,35 +3698,7 @@
               </a:rPr>
               <a:t>[assinatura_2]</a:t>
             </a:r>
-            <a:endParaRPr lang="pt-BR" dirty="0"/>
-          </a:p>
-          <a:p>
-            <a:pPr defTabSz="914400">
-              <a:lnSpc>
-                <a:spcPct val="100000"/>
-              </a:lnSpc>
-            </a:pPr>
-            <a:endParaRPr lang="en-US" sz="700" b="0" u="none" strike="noStrike" dirty="0">
-              <a:solidFill>
-                <a:srgbClr val="000000"/>
-              </a:solidFill>
-              <a:uFillTx/>
-              <a:latin typeface="Arial"/>
-            </a:endParaRPr>
-          </a:p>
-          <a:p>
-            <a:pPr defTabSz="914400">
-              <a:lnSpc>
-                <a:spcPct val="100000"/>
-              </a:lnSpc>
-            </a:pPr>
-            <a:endParaRPr lang="en-US" sz="700" b="0" u="none" strike="noStrike" dirty="0">
-              <a:solidFill>
-                <a:srgbClr val="000000"/>
-              </a:solidFill>
-              <a:uFillTx/>
-              <a:latin typeface="Arial"/>
-            </a:endParaRPr>
+            <a:endParaRPr lang="pt-BR" sz="800" dirty="0"/>
           </a:p>
           <a:p>
             <a:pPr defTabSz="914400">
@@ -3805,7 +3777,7 @@
           <a:p>
             <a:pPr algn="ctr"/>
             <a:r>
-              <a:rPr lang="pt-BR" sz="800" dirty="0">
+              <a:rPr lang="pt-BR" sz="700" dirty="0">
                 <a:solidFill>
                   <a:schemeClr val="dk1"/>
                 </a:solidFill>
@@ -3815,7 +3787,7 @@
               <a:t>[qualificacao</a:t>
             </a:r>
             <a:r>
-              <a:rPr lang="pt-BR" sz="800" b="0" u="none" strike="noStrike" dirty="0">
+              <a:rPr lang="pt-BR" sz="700" b="0" u="none" strike="noStrike" dirty="0">
                 <a:solidFill>
                   <a:schemeClr val="dk1"/>
                 </a:solidFill>
@@ -3826,7 +3798,7 @@
               <a:t>_</a:t>
             </a:r>
             <a:r>
-              <a:rPr lang="pt-BR" sz="800" dirty="0">
+              <a:rPr lang="pt-BR" sz="700" dirty="0">
                 <a:solidFill>
                   <a:schemeClr val="dk1"/>
                 </a:solidFill>
@@ -3836,7 +3808,7 @@
               <a:t>profissional2</a:t>
             </a:r>
             <a:r>
-              <a:rPr lang="pt-BR" sz="800" b="0" u="none" strike="noStrike" dirty="0">
+              <a:rPr lang="pt-BR" sz="700" b="0" u="none" strike="noStrike" dirty="0">
                 <a:solidFill>
                   <a:schemeClr val="dk1"/>
                 </a:solidFill>
@@ -3846,7 +3818,7 @@
               </a:rPr>
               <a:t>]</a:t>
             </a:r>
-            <a:endParaRPr lang="pt-BR" sz="800" dirty="0">
+            <a:endParaRPr lang="pt-BR" sz="700" dirty="0">
               <a:solidFill>
                 <a:schemeClr val="dk1"/>
               </a:solidFill>
@@ -3862,7 +3834,7 @@
               </a:lnSpc>
             </a:pPr>
             <a:r>
-              <a:rPr lang="pt-BR" sz="800" b="0" u="none" strike="noStrike" dirty="0">
+              <a:rPr lang="pt-BR" sz="700" b="0" u="none" strike="noStrike" dirty="0">
                 <a:solidFill>
                   <a:schemeClr val="dk1"/>
                 </a:solidFill>
@@ -3873,7 +3845,7 @@
               <a:t>[</a:t>
             </a:r>
             <a:r>
-              <a:rPr lang="pt-BR" sz="800" dirty="0">
+              <a:rPr lang="pt-BR" sz="700" dirty="0">
                 <a:solidFill>
                   <a:schemeClr val="dk1"/>
                 </a:solidFill>
@@ -3883,7 +3855,7 @@
               <a:t>registro</a:t>
             </a:r>
             <a:r>
-              <a:rPr lang="pt-BR" sz="800" b="0" u="none" strike="noStrike" dirty="0">
+              <a:rPr lang="pt-BR" sz="700" b="0" u="none" strike="noStrike" dirty="0">
                 <a:solidFill>
                   <a:schemeClr val="dk1"/>
                 </a:solidFill>
@@ -3894,7 +3866,7 @@
               <a:t>_</a:t>
             </a:r>
             <a:r>
-              <a:rPr lang="pt-BR" sz="800" dirty="0">
+              <a:rPr lang="pt-BR" sz="700" dirty="0">
                 <a:solidFill>
                   <a:schemeClr val="dk1"/>
                 </a:solidFill>
@@ -3904,7 +3876,7 @@
               <a:t>qualificacao2</a:t>
             </a:r>
             <a:r>
-              <a:rPr lang="pt-BR" sz="800" b="0" u="none" strike="noStrike" dirty="0">
+              <a:rPr lang="pt-BR" sz="700" b="0" u="none" strike="noStrike" dirty="0">
                 <a:solidFill>
                   <a:schemeClr val="dk1"/>
                 </a:solidFill>
@@ -3914,10 +3886,38 @@
               </a:rPr>
               <a:t>]</a:t>
             </a:r>
-            <a:endParaRPr lang="en-US" dirty="0">
+            <a:endParaRPr lang="en-US" sz="700" dirty="0">
               <a:solidFill>
                 <a:schemeClr val="dk1"/>
               </a:solidFill>
+            </a:endParaRPr>
+          </a:p>
+          <a:p>
+            <a:pPr algn="ctr" defTabSz="914400">
+              <a:lnSpc>
+                <a:spcPct val="100000"/>
+              </a:lnSpc>
+            </a:pPr>
+            <a:endParaRPr lang="en-US" sz="700" b="0" u="none" strike="noStrike" dirty="0">
+              <a:solidFill>
+                <a:srgbClr val="000000"/>
+              </a:solidFill>
+              <a:uFillTx/>
+              <a:latin typeface="Arial"/>
+            </a:endParaRPr>
+          </a:p>
+          <a:p>
+            <a:pPr defTabSz="914400">
+              <a:lnSpc>
+                <a:spcPct val="100000"/>
+              </a:lnSpc>
+            </a:pPr>
+            <a:endParaRPr lang="en-US" sz="700" b="0" u="none" strike="noStrike" dirty="0">
+              <a:solidFill>
+                <a:srgbClr val="000000"/>
+              </a:solidFill>
+              <a:uFillTx/>
+              <a:latin typeface="Arial"/>
             </a:endParaRPr>
           </a:p>
         </p:txBody>

</xml_diff>